<commit_message>
cleaned notebooks, removed scraped folder
</commit_message>
<xml_diff>
--- a/visuals/Capstone - Presentation.pptx
+++ b/visuals/Capstone - Presentation.pptx
@@ -104,6 +104,11 @@
       </a:defRPr>
     </a:lvl9pPr>
   </p:defaultTextStyle>
+  <p:extLst>
+    <p:ext uri="{EFAFB233-063F-42B5-8137-9DF3F51BA10A}">
+      <p15:sldGuideLst xmlns:p15="http://schemas.microsoft.com/office/powerpoint/2012/main"/>
+    </p:ext>
+  </p:extLst>
 </p:presentation>
 </file>
 
@@ -254,7 +259,7 @@
           <a:p>
             <a:fld id="{74F230B8-DE9C-4A11-8FD7-39AC8F0C7A58}" type="datetimeFigureOut">
               <a:rPr lang="en-US" smtClean="0"/>
-              <a:t>10/13/2020</a:t>
+              <a:t>10/21/2020</a:t>
             </a:fld>
             <a:endParaRPr lang="en-US"/>
           </a:p>
@@ -452,7 +457,7 @@
           <a:p>
             <a:fld id="{74F230B8-DE9C-4A11-8FD7-39AC8F0C7A58}" type="datetimeFigureOut">
               <a:rPr lang="en-US" smtClean="0"/>
-              <a:t>10/13/2020</a:t>
+              <a:t>10/21/2020</a:t>
             </a:fld>
             <a:endParaRPr lang="en-US"/>
           </a:p>
@@ -660,7 +665,7 @@
           <a:p>
             <a:fld id="{74F230B8-DE9C-4A11-8FD7-39AC8F0C7A58}" type="datetimeFigureOut">
               <a:rPr lang="en-US" smtClean="0"/>
-              <a:t>10/13/2020</a:t>
+              <a:t>10/21/2020</a:t>
             </a:fld>
             <a:endParaRPr lang="en-US"/>
           </a:p>
@@ -858,7 +863,7 @@
           <a:p>
             <a:fld id="{74F230B8-DE9C-4A11-8FD7-39AC8F0C7A58}" type="datetimeFigureOut">
               <a:rPr lang="en-US" smtClean="0"/>
-              <a:t>10/13/2020</a:t>
+              <a:t>10/21/2020</a:t>
             </a:fld>
             <a:endParaRPr lang="en-US"/>
           </a:p>
@@ -1133,7 +1138,7 @@
           <a:p>
             <a:fld id="{74F230B8-DE9C-4A11-8FD7-39AC8F0C7A58}" type="datetimeFigureOut">
               <a:rPr lang="en-US" smtClean="0"/>
-              <a:t>10/13/2020</a:t>
+              <a:t>10/21/2020</a:t>
             </a:fld>
             <a:endParaRPr lang="en-US"/>
           </a:p>
@@ -1398,7 +1403,7 @@
           <a:p>
             <a:fld id="{74F230B8-DE9C-4A11-8FD7-39AC8F0C7A58}" type="datetimeFigureOut">
               <a:rPr lang="en-US" smtClean="0"/>
-              <a:t>10/13/2020</a:t>
+              <a:t>10/21/2020</a:t>
             </a:fld>
             <a:endParaRPr lang="en-US"/>
           </a:p>
@@ -1810,7 +1815,7 @@
           <a:p>
             <a:fld id="{74F230B8-DE9C-4A11-8FD7-39AC8F0C7A58}" type="datetimeFigureOut">
               <a:rPr lang="en-US" smtClean="0"/>
-              <a:t>10/13/2020</a:t>
+              <a:t>10/21/2020</a:t>
             </a:fld>
             <a:endParaRPr lang="en-US"/>
           </a:p>
@@ -1951,7 +1956,7 @@
           <a:p>
             <a:fld id="{74F230B8-DE9C-4A11-8FD7-39AC8F0C7A58}" type="datetimeFigureOut">
               <a:rPr lang="en-US" smtClean="0"/>
-              <a:t>10/13/2020</a:t>
+              <a:t>10/21/2020</a:t>
             </a:fld>
             <a:endParaRPr lang="en-US"/>
           </a:p>
@@ -2064,7 +2069,7 @@
           <a:p>
             <a:fld id="{74F230B8-DE9C-4A11-8FD7-39AC8F0C7A58}" type="datetimeFigureOut">
               <a:rPr lang="en-US" smtClean="0"/>
-              <a:t>10/13/2020</a:t>
+              <a:t>10/21/2020</a:t>
             </a:fld>
             <a:endParaRPr lang="en-US"/>
           </a:p>
@@ -2375,7 +2380,7 @@
           <a:p>
             <a:fld id="{74F230B8-DE9C-4A11-8FD7-39AC8F0C7A58}" type="datetimeFigureOut">
               <a:rPr lang="en-US" smtClean="0"/>
-              <a:t>10/13/2020</a:t>
+              <a:t>10/21/2020</a:t>
             </a:fld>
             <a:endParaRPr lang="en-US"/>
           </a:p>
@@ -2663,7 +2668,7 @@
           <a:p>
             <a:fld id="{74F230B8-DE9C-4A11-8FD7-39AC8F0C7A58}" type="datetimeFigureOut">
               <a:rPr lang="en-US" smtClean="0"/>
-              <a:t>10/13/2020</a:t>
+              <a:t>10/21/2020</a:t>
             </a:fld>
             <a:endParaRPr lang="en-US"/>
           </a:p>
@@ -2904,7 +2909,7 @@
           <a:p>
             <a:fld id="{74F230B8-DE9C-4A11-8FD7-39AC8F0C7A58}" type="datetimeFigureOut">
               <a:rPr lang="en-US" smtClean="0"/>
-              <a:t>10/13/2020</a:t>
+              <a:t>10/21/2020</a:t>
             </a:fld>
             <a:endParaRPr lang="en-US"/>
           </a:p>
@@ -3338,14 +3343,14 @@
               <p:nvPr>
                 <p:extLst>
                   <p:ext uri="{D42A27DB-BD31-4B8C-83A1-F6EECF244321}">
-                    <p14:modId xmlns:p14="http://schemas.microsoft.com/office/powerpoint/2010/main" val="1650891070"/>
+                    <p14:modId xmlns:p14="http://schemas.microsoft.com/office/powerpoint/2010/main" val="3802231181"/>
                   </p:ext>
                 </p:extLst>
               </p:nvPr>
             </p:nvGraphicFramePr>
             <p:xfrm>
-              <a:off x="847288" y="360726"/>
-              <a:ext cx="10586906" cy="6040073"/>
+              <a:off x="335560" y="67112"/>
+              <a:ext cx="9471170" cy="6644081"/>
             </p:xfrm>
             <a:graphic>
               <a:graphicData uri="http://schemas.microsoft.com/office/webextensions/webextension/2010/11">
@@ -3377,8 +3382,8 @@
             </p:blipFill>
             <p:spPr>
               <a:xfrm>
-                <a:off x="847288" y="360726"/>
-                <a:ext cx="10586906" cy="6040073"/>
+                <a:off x="335560" y="67112"/>
+                <a:ext cx="9471170" cy="6644081"/>
               </a:xfrm>
               <a:prstGeom prst="rect">
                 <a:avLst/>

</xml_diff>